<commit_message>
changes from Fall 23
</commit_message>
<xml_diff>
--- a/3.Linux/05.Apps and Services/Linux Systemd.pptx
+++ b/3.Linux/05.Apps and Services/Linux Systemd.pptx
@@ -299,7 +299,7 @@
           <a:p>
             <a:fld id="{CFDCE5E7-38F3-4C52-88E1-46FF7EBD938E}" type="datetimeFigureOut">
               <a:rPr lang="en-US" smtClean="0"/>
-              <a:t>8/23/2019</a:t>
+              <a:t>9/1/2023</a:t>
             </a:fld>
             <a:endParaRPr lang="en-US"/>
           </a:p>
@@ -497,7 +497,7 @@
           <a:p>
             <a:fld id="{CFDCE5E7-38F3-4C52-88E1-46FF7EBD938E}" type="datetimeFigureOut">
               <a:rPr lang="en-US" smtClean="0"/>
-              <a:t>8/23/2019</a:t>
+              <a:t>9/1/2023</a:t>
             </a:fld>
             <a:endParaRPr lang="en-US"/>
           </a:p>
@@ -705,7 +705,7 @@
           <a:p>
             <a:fld id="{CFDCE5E7-38F3-4C52-88E1-46FF7EBD938E}" type="datetimeFigureOut">
               <a:rPr lang="en-US" smtClean="0"/>
-              <a:t>8/23/2019</a:t>
+              <a:t>9/1/2023</a:t>
             </a:fld>
             <a:endParaRPr lang="en-US"/>
           </a:p>
@@ -903,7 +903,7 @@
           <a:p>
             <a:fld id="{CFDCE5E7-38F3-4C52-88E1-46FF7EBD938E}" type="datetimeFigureOut">
               <a:rPr lang="en-US" smtClean="0"/>
-              <a:t>8/23/2019</a:t>
+              <a:t>9/1/2023</a:t>
             </a:fld>
             <a:endParaRPr lang="en-US"/>
           </a:p>
@@ -1178,7 +1178,7 @@
           <a:p>
             <a:fld id="{CFDCE5E7-38F3-4C52-88E1-46FF7EBD938E}" type="datetimeFigureOut">
               <a:rPr lang="en-US" smtClean="0"/>
-              <a:t>8/23/2019</a:t>
+              <a:t>9/1/2023</a:t>
             </a:fld>
             <a:endParaRPr lang="en-US"/>
           </a:p>
@@ -1443,7 +1443,7 @@
           <a:p>
             <a:fld id="{CFDCE5E7-38F3-4C52-88E1-46FF7EBD938E}" type="datetimeFigureOut">
               <a:rPr lang="en-US" smtClean="0"/>
-              <a:t>8/23/2019</a:t>
+              <a:t>9/1/2023</a:t>
             </a:fld>
             <a:endParaRPr lang="en-US"/>
           </a:p>
@@ -1855,7 +1855,7 @@
           <a:p>
             <a:fld id="{CFDCE5E7-38F3-4C52-88E1-46FF7EBD938E}" type="datetimeFigureOut">
               <a:rPr lang="en-US" smtClean="0"/>
-              <a:t>8/23/2019</a:t>
+              <a:t>9/1/2023</a:t>
             </a:fld>
             <a:endParaRPr lang="en-US"/>
           </a:p>
@@ -1996,7 +1996,7 @@
           <a:p>
             <a:fld id="{CFDCE5E7-38F3-4C52-88E1-46FF7EBD938E}" type="datetimeFigureOut">
               <a:rPr lang="en-US" smtClean="0"/>
-              <a:t>8/23/2019</a:t>
+              <a:t>9/1/2023</a:t>
             </a:fld>
             <a:endParaRPr lang="en-US"/>
           </a:p>
@@ -2109,7 +2109,7 @@
           <a:p>
             <a:fld id="{CFDCE5E7-38F3-4C52-88E1-46FF7EBD938E}" type="datetimeFigureOut">
               <a:rPr lang="en-US" smtClean="0"/>
-              <a:t>8/23/2019</a:t>
+              <a:t>9/1/2023</a:t>
             </a:fld>
             <a:endParaRPr lang="en-US"/>
           </a:p>
@@ -2420,7 +2420,7 @@
           <a:p>
             <a:fld id="{CFDCE5E7-38F3-4C52-88E1-46FF7EBD938E}" type="datetimeFigureOut">
               <a:rPr lang="en-US" smtClean="0"/>
-              <a:t>8/23/2019</a:t>
+              <a:t>9/1/2023</a:t>
             </a:fld>
             <a:endParaRPr lang="en-US"/>
           </a:p>
@@ -2708,7 +2708,7 @@
           <a:p>
             <a:fld id="{CFDCE5E7-38F3-4C52-88E1-46FF7EBD938E}" type="datetimeFigureOut">
               <a:rPr lang="en-US" smtClean="0"/>
-              <a:t>8/23/2019</a:t>
+              <a:t>9/1/2023</a:t>
             </a:fld>
             <a:endParaRPr lang="en-US"/>
           </a:p>
@@ -2949,7 +2949,7 @@
           <a:p>
             <a:fld id="{CFDCE5E7-38F3-4C52-88E1-46FF7EBD938E}" type="datetimeFigureOut">
               <a:rPr lang="en-US" smtClean="0"/>
-              <a:t>8/23/2019</a:t>
+              <a:t>9/1/2023</a:t>
             </a:fld>
             <a:endParaRPr lang="en-US"/>
           </a:p>
@@ -5563,7 +5563,7 @@
           <a:p>
             <a:r>
               <a:rPr lang="en-US" dirty="0"/>
-              <a:t>The enable and disable commands control whether or not a service will start at boot</a:t>
+              <a:t>The enable and disable commands control whether a service will start at boot</a:t>
             </a:r>
           </a:p>
           <a:p>

</xml_diff>